<commit_message>
updated explanation of r7
</commit_message>
<xml_diff>
--- a/cs447jb_rec6_mar30_and_apr2.pptx
+++ b/cs447jb_rec6_mar30_and_apr2.pptx
@@ -14,9 +14,9 @@
     <p:sldId id="261" r:id="rId5"/>
     <p:sldId id="262" r:id="rId6"/>
     <p:sldId id="263" r:id="rId7"/>
-    <p:sldId id="264" r:id="rId8"/>
-    <p:sldId id="265" r:id="rId9"/>
-    <p:sldId id="266" r:id="rId10"/>
+    <p:sldId id="265" r:id="rId8"/>
+    <p:sldId id="266" r:id="rId9"/>
+    <p:sldId id="269" r:id="rId10"/>
     <p:sldId id="267" r:id="rId11"/>
   </p:sldIdLst>
   <p:sldSz cx="9144000" cy="6858000" type="screen4x3"/>
@@ -1158,7 +1158,7 @@
     </p:spTree>
     <p:extLst>
       <p:ext uri="{BB962C8B-B14F-4D97-AF65-F5344CB8AC3E}">
-        <p14:creationId xmlns:p14="http://schemas.microsoft.com/office/powerpoint/2010/main" val="3960656793"/>
+        <p14:creationId xmlns:p14="http://schemas.microsoft.com/office/powerpoint/2010/main" val="915837939"/>
       </p:ext>
     </p:extLst>
   </p:cSld>
@@ -1242,7 +1242,7 @@
     </p:spTree>
     <p:extLst>
       <p:ext uri="{BB962C8B-B14F-4D97-AF65-F5344CB8AC3E}">
-        <p14:creationId xmlns:p14="http://schemas.microsoft.com/office/powerpoint/2010/main" val="915837939"/>
+        <p14:creationId xmlns:p14="http://schemas.microsoft.com/office/powerpoint/2010/main" val="3647094671"/>
       </p:ext>
     </p:extLst>
   </p:cSld>
@@ -1326,7 +1326,7 @@
     </p:spTree>
     <p:extLst>
       <p:ext uri="{BB962C8B-B14F-4D97-AF65-F5344CB8AC3E}">
-        <p14:creationId xmlns:p14="http://schemas.microsoft.com/office/powerpoint/2010/main" val="3647094671"/>
+        <p14:creationId xmlns:p14="http://schemas.microsoft.com/office/powerpoint/2010/main" val="2907217182"/>
       </p:ext>
     </p:extLst>
   </p:cSld>
@@ -4328,6 +4328,13 @@
   <p:clrMapOvr>
     <a:masterClrMapping/>
   </p:clrMapOvr>
+  <p:timing>
+    <p:tnLst>
+      <p:par>
+        <p:cTn id="1" dur="indefinite" restart="never" nodeType="tmRoot"/>
+      </p:par>
+    </p:tnLst>
+  </p:timing>
 </p:sld>
 </file>
 
@@ -4395,7 +4402,7 @@
         <p:spPr>
           <a:xfrm>
             <a:off x="329184" y="734580"/>
-            <a:ext cx="7545247" cy="8217634"/>
+            <a:ext cx="7545247" cy="6370975"/>
           </a:xfrm>
           <a:prstGeom prst="rect">
             <a:avLst/>
@@ -4465,8 +4472,13 @@
             </a:pPr>
             <a:r>
               <a:rPr lang="en-US" sz="2400" dirty="0"/>
-              <a:t>The contents of r7 should increase even when incr7 is off.</a:t>
-            </a:r>
+              <a:t>The contents of r7 should increase </a:t>
+            </a:r>
+            <a:r>
+              <a:rPr lang="en-US" sz="2400" dirty="0" smtClean="0"/>
+              <a:t>even with write enable off.</a:t>
+            </a:r>
+            <a:endParaRPr lang="en-US" sz="2400" dirty="0"/>
           </a:p>
           <a:p>
             <a:pPr marL="800100" lvl="1" indent="-342900">
@@ -4502,8 +4514,13 @@
             </a:pPr>
             <a:r>
               <a:rPr lang="en-US" sz="2400" dirty="0"/>
-              <a:t>On the output pins, you should see the value auto-decrease.</a:t>
-            </a:r>
+              <a:t>On the output pins, you should see the value </a:t>
+            </a:r>
+            <a:r>
+              <a:rPr lang="en-US" sz="2400" dirty="0" smtClean="0"/>
+              <a:t>auto-decrease immediately</a:t>
+            </a:r>
+            <a:endParaRPr lang="en-US" sz="2400" dirty="0"/>
           </a:p>
           <a:p>
             <a:pPr lvl="1"/>
@@ -4518,28 +4535,6 @@
               </a:rPr>
               <a:t>Final test: Try to both write a value to one register, and perform autoincrement on r7 at the same time.</a:t>
             </a:r>
-          </a:p>
-          <a:p>
-            <a:endParaRPr lang="en-US" sz="2400" dirty="0"/>
-          </a:p>
-          <a:p>
-            <a:endParaRPr lang="en-US" sz="2400" dirty="0"/>
-          </a:p>
-          <a:p>
-            <a:endParaRPr lang="en-US" sz="2400" dirty="0"/>
-          </a:p>
-          <a:p>
-            <a:r>
-              <a:rPr lang="en-US" sz="2400" dirty="0"/>
-              <a:t> </a:t>
-            </a:r>
-          </a:p>
-          <a:p>
-            <a:pPr marL="457200" indent="-457200">
-              <a:buFont typeface="+mj-lt"/>
-              <a:buAutoNum type="arabicPeriod"/>
-            </a:pPr>
-            <a:endParaRPr lang="en-US" sz="2400" dirty="0"/>
           </a:p>
           <a:p>
             <a:endParaRPr lang="en-US" sz="2400" dirty="0"/>
@@ -4556,6 +4551,13 @@
   <p:clrMapOvr>
     <a:masterClrMapping/>
   </p:clrMapOvr>
+  <p:timing>
+    <p:tnLst>
+      <p:par>
+        <p:cTn id="1" dur="indefinite" restart="never" nodeType="tmRoot"/>
+      </p:par>
+    </p:tnLst>
+  </p:timing>
 </p:sld>
 </file>
 
@@ -4698,8 +4700,39 @@
             </a:pPr>
             <a:r>
               <a:rPr lang="en-US" sz="2400" dirty="0"/>
-              <a:t>A designated register (#7) will auto-increment or decrement, depending on the actions taken on another register</a:t>
-            </a:r>
+              <a:t>A designated register </a:t>
+            </a:r>
+            <a:r>
+              <a:rPr lang="en-US" sz="2400" dirty="0" smtClean="0"/>
+              <a:t>(r7) </a:t>
+            </a:r>
+            <a:r>
+              <a:rPr lang="en-US" sz="2400" dirty="0"/>
+              <a:t>will auto-increment or </a:t>
+            </a:r>
+            <a:r>
+              <a:rPr lang="en-US" sz="2400" dirty="0" smtClean="0"/>
+              <a:t>auto-decrement </a:t>
+            </a:r>
+            <a:r>
+              <a:rPr lang="en-US" sz="2400" u="sng" dirty="0" smtClean="0"/>
+              <a:t>if</a:t>
+            </a:r>
+            <a:r>
+              <a:rPr lang="en-US" sz="2400" dirty="0" smtClean="0"/>
+              <a:t> specific input pins are set to request this</a:t>
+            </a:r>
+          </a:p>
+          <a:p>
+            <a:pPr marL="800100" lvl="1" indent="-342900">
+              <a:buFont typeface="Arial" panose="020B0604020202020204" pitchFamily="34" charset="0"/>
+              <a:buChar char="•"/>
+            </a:pPr>
+            <a:r>
+              <a:rPr lang="en-US" sz="2400" dirty="0" smtClean="0"/>
+              <a:t>Otherwise it will behave normally</a:t>
+            </a:r>
+            <a:endParaRPr lang="en-US" sz="2400" dirty="0"/>
           </a:p>
         </p:txBody>
       </p:sp>
@@ -4713,6 +4746,13 @@
   <p:clrMapOvr>
     <a:masterClrMapping/>
   </p:clrMapOvr>
+  <p:timing>
+    <p:tnLst>
+      <p:par>
+        <p:cTn id="1" dur="indefinite" restart="never" nodeType="tmRoot"/>
+      </p:par>
+    </p:tnLst>
+  </p:timing>
 </p:sld>
 </file>
 
@@ -4796,7 +4836,7 @@
         <p:spPr>
           <a:xfrm>
             <a:off x="383764" y="1012062"/>
-            <a:ext cx="7545247" cy="1569660"/>
+            <a:ext cx="7545247" cy="1938992"/>
           </a:xfrm>
           <a:prstGeom prst="rect">
             <a:avLst/>
@@ -4814,8 +4854,23 @@
             </a:pPr>
             <a:r>
               <a:rPr lang="en-US" sz="2400" dirty="0"/>
-              <a:t>Their use is encouraged for this lab.</a:t>
-            </a:r>
+              <a:t>Their use is encouraged for this lab</a:t>
+            </a:r>
+            <a:r>
+              <a:rPr lang="en-US" sz="2400" dirty="0" smtClean="0"/>
+              <a:t>.</a:t>
+            </a:r>
+          </a:p>
+          <a:p>
+            <a:pPr marL="914400" lvl="1" indent="-457200">
+              <a:buFont typeface="Arial" panose="020B0604020202020204" pitchFamily="34" charset="0"/>
+              <a:buChar char="•"/>
+            </a:pPr>
+            <a:r>
+              <a:rPr lang="en-US" sz="2200" dirty="0" smtClean="0"/>
+              <a:t>This will be useful preparation for the project.</a:t>
+            </a:r>
+            <a:endParaRPr lang="en-US" sz="2200" dirty="0"/>
           </a:p>
           <a:p>
             <a:pPr marL="457200" indent="-457200">
@@ -4846,6 +4901,13 @@
   <p:clrMapOvr>
     <a:masterClrMapping/>
   </p:clrMapOvr>
+  <p:timing>
+    <p:tnLst>
+      <p:par>
+        <p:cTn id="1" dur="indefinite" restart="never" nodeType="tmRoot"/>
+      </p:par>
+    </p:tnLst>
+  </p:timing>
 </p:sld>
 </file>
 
@@ -4996,8 +5058,8 @@
         </p:nvSpPr>
         <p:spPr>
           <a:xfrm>
-            <a:off x="5761288" y="1107996"/>
-            <a:ext cx="3382712" cy="1754326"/>
+            <a:off x="5897475" y="1107995"/>
+            <a:ext cx="2704265" cy="1200329"/>
           </a:xfrm>
           <a:prstGeom prst="rect">
             <a:avLst/>
@@ -5010,42 +5072,30 @@
           </a:bodyPr>
           <a:lstStyle/>
           <a:p>
-            <a:pPr marL="285750" indent="-285750">
-              <a:buFont typeface="Wingdings" panose="05000000000000000000" pitchFamily="2" charset="2"/>
-              <a:buChar char="à"/>
-            </a:pPr>
+            <a:r>
+              <a:rPr lang="en-US" dirty="0" smtClean="0">
+                <a:solidFill>
+                  <a:srgbClr val="0070C0"/>
+                </a:solidFill>
+                <a:sym typeface="Wingdings" panose="05000000000000000000" pitchFamily="2" charset="2"/>
+              </a:rPr>
+              <a:t> </a:t>
+            </a:r>
+            <a:r>
+              <a:rPr lang="en-US" dirty="0" smtClean="0">
+                <a:solidFill>
+                  <a:srgbClr val="0070C0"/>
+                </a:solidFill>
+              </a:rPr>
+              <a:t>Labels </a:t>
+            </a:r>
             <a:r>
               <a:rPr lang="en-US" dirty="0">
                 <a:solidFill>
                   <a:srgbClr val="0070C0"/>
                 </a:solidFill>
               </a:rPr>
-              <a:t>(These are all input or output pins, except for the clock)</a:t>
-            </a:r>
-          </a:p>
-          <a:p>
-            <a:pPr marL="285750" indent="-285750">
-              <a:buFont typeface="Wingdings" panose="05000000000000000000" pitchFamily="2" charset="2"/>
-              <a:buChar char="à"/>
-            </a:pPr>
-            <a:endParaRPr lang="en-US" dirty="0">
-              <a:solidFill>
-                <a:srgbClr val="0070C0"/>
-              </a:solidFill>
-            </a:endParaRPr>
-          </a:p>
-          <a:p>
-            <a:pPr marL="285750" indent="-285750">
-              <a:buFont typeface="Wingdings" panose="05000000000000000000" pitchFamily="2" charset="2"/>
-              <a:buChar char="à"/>
-            </a:pPr>
-            <a:r>
-              <a:rPr lang="en-US" dirty="0">
-                <a:solidFill>
-                  <a:srgbClr val="0070C0"/>
-                </a:solidFill>
-              </a:rPr>
-              <a:t>Labels will make it easier to identify these pins from outside the </a:t>
+              <a:t>will make it easier to identify these pins from outside the </a:t>
             </a:r>
             <a:r>
               <a:rPr lang="en-US" dirty="0" err="1">
@@ -5076,6 +5126,13 @@
   <p:clrMapOvr>
     <a:masterClrMapping/>
   </p:clrMapOvr>
+  <p:timing>
+    <p:tnLst>
+      <p:par>
+        <p:cTn id="1" dur="indefinite" restart="never" nodeType="tmRoot"/>
+      </p:par>
+    </p:tnLst>
+  </p:timing>
 </p:sld>
 </file>
 
@@ -5143,7 +5200,7 @@
         <p:spPr>
           <a:xfrm>
             <a:off x="528246" y="800100"/>
-            <a:ext cx="7545247" cy="2308324"/>
+            <a:ext cx="7545247" cy="2677656"/>
           </a:xfrm>
           <a:prstGeom prst="rect">
             <a:avLst/>
@@ -5161,8 +5218,23 @@
             </a:pPr>
             <a:r>
               <a:rPr lang="en-US" sz="2400" dirty="0"/>
-              <a:t>Create 8 of them</a:t>
-            </a:r>
+              <a:t>Create 8 of </a:t>
+            </a:r>
+            <a:r>
+              <a:rPr lang="en-US" sz="2400" dirty="0" smtClean="0"/>
+              <a:t>them</a:t>
+            </a:r>
+          </a:p>
+          <a:p>
+            <a:pPr marL="914400" lvl="1" indent="-457200">
+              <a:buFont typeface="Arial" panose="020B0604020202020204" pitchFamily="34" charset="0"/>
+              <a:buChar char="•"/>
+            </a:pPr>
+            <a:r>
+              <a:rPr lang="en-US" sz="2200" dirty="0" smtClean="0"/>
+              <a:t>For now, r7 can be treated like the others</a:t>
+            </a:r>
+            <a:endParaRPr lang="en-US" sz="2200" dirty="0"/>
           </a:p>
           <a:p>
             <a:pPr marL="457200" indent="-457200">
@@ -5210,6 +5282,13 @@
   <p:clrMapOvr>
     <a:masterClrMapping/>
   </p:clrMapOvr>
+  <p:timing>
+    <p:tnLst>
+      <p:par>
+        <p:cTn id="1" dur="indefinite" restart="never" nodeType="tmRoot"/>
+      </p:par>
+    </p:tnLst>
+  </p:timing>
 </p:sld>
 </file>
 
@@ -5371,7 +5450,23 @@
                   <a:srgbClr val="002060"/>
                 </a:solidFill>
               </a:rPr>
-              <a:t>Differences for this lab</a:t>
+              <a:t>Differences </a:t>
+            </a:r>
+            <a:r>
+              <a:rPr lang="en-US" sz="2200" b="1" u="sng" dirty="0" smtClean="0">
+                <a:solidFill>
+                  <a:srgbClr val="002060"/>
+                </a:solidFill>
+              </a:rPr>
+              <a:t>between this figure and the </a:t>
+            </a:r>
+            <a:r>
+              <a:rPr lang="en-US" sz="2200" b="1" u="sng" dirty="0">
+                <a:solidFill>
+                  <a:srgbClr val="002060"/>
+                </a:solidFill>
+              </a:rPr>
+              <a:t>lab</a:t>
             </a:r>
             <a:r>
               <a:rPr lang="en-US" sz="2200" dirty="0">
@@ -5393,8 +5488,21 @@
                   <a:srgbClr val="002060"/>
                 </a:solidFill>
               </a:rPr>
-              <a:t>You’ll need two of these.</a:t>
-            </a:r>
+              <a:t>You’ll need two </a:t>
+            </a:r>
+            <a:r>
+              <a:rPr lang="en-US" sz="2200" dirty="0" smtClean="0">
+                <a:solidFill>
+                  <a:srgbClr val="002060"/>
+                </a:solidFill>
+              </a:rPr>
+              <a:t>read ports.</a:t>
+            </a:r>
+            <a:endParaRPr lang="en-US" sz="2200" dirty="0">
+              <a:solidFill>
+                <a:srgbClr val="002060"/>
+              </a:solidFill>
+            </a:endParaRPr>
           </a:p>
           <a:p>
             <a:pPr marL="342900" indent="-342900">
@@ -5407,8 +5515,77 @@
                   <a:srgbClr val="002060"/>
                 </a:solidFill>
               </a:rPr>
-              <a:t>There will be 8 registers.  The bit width of the select bits attribute of the MUX will need to be wide enough to uniquely specify the 8 registers.  </a:t>
-            </a:r>
+              <a:t>There will be 8 registers.  The bit width of the select bits attribute of the </a:t>
+            </a:r>
+            <a:r>
+              <a:rPr lang="en-US" sz="2200" dirty="0" err="1" smtClean="0">
+                <a:solidFill>
+                  <a:srgbClr val="002060"/>
+                </a:solidFill>
+              </a:rPr>
+              <a:t>MUXes</a:t>
+            </a:r>
+            <a:r>
+              <a:rPr lang="en-US" sz="2200" dirty="0" smtClean="0">
+                <a:solidFill>
+                  <a:srgbClr val="002060"/>
+                </a:solidFill>
+              </a:rPr>
+              <a:t> </a:t>
+            </a:r>
+            <a:r>
+              <a:rPr lang="en-US" sz="2200" dirty="0">
+                <a:solidFill>
+                  <a:srgbClr val="002060"/>
+                </a:solidFill>
+              </a:rPr>
+              <a:t>will need to </a:t>
+            </a:r>
+            <a:r>
+              <a:rPr lang="en-US" sz="2200" dirty="0" smtClean="0">
+                <a:solidFill>
+                  <a:srgbClr val="002060"/>
+                </a:solidFill>
+              </a:rPr>
+              <a:t>be 3 (to match </a:t>
+            </a:r>
+            <a:r>
+              <a:rPr lang="en-US" sz="2200" dirty="0" err="1" smtClean="0">
+                <a:solidFill>
+                  <a:srgbClr val="002060"/>
+                </a:solidFill>
+              </a:rPr>
+              <a:t>rs</a:t>
+            </a:r>
+            <a:r>
+              <a:rPr lang="en-US" sz="2200" dirty="0" smtClean="0">
+                <a:solidFill>
+                  <a:srgbClr val="002060"/>
+                </a:solidFill>
+              </a:rPr>
+              <a:t> and </a:t>
+            </a:r>
+            <a:r>
+              <a:rPr lang="en-US" sz="2200" dirty="0" err="1" smtClean="0">
+                <a:solidFill>
+                  <a:srgbClr val="002060"/>
+                </a:solidFill>
+              </a:rPr>
+              <a:t>rt</a:t>
+            </a:r>
+            <a:r>
+              <a:rPr lang="en-US" sz="2200" dirty="0" smtClean="0">
+                <a:solidFill>
+                  <a:srgbClr val="002060"/>
+                </a:solidFill>
+              </a:rPr>
+              <a:t>).  Registers will be numbered 000 to 111, in binary.</a:t>
+            </a:r>
+            <a:endParaRPr lang="en-US" sz="2200" dirty="0">
+              <a:solidFill>
+                <a:srgbClr val="002060"/>
+              </a:solidFill>
+            </a:endParaRPr>
           </a:p>
         </p:txBody>
       </p:sp>
@@ -5422,6 +5599,13 @@
   <p:clrMapOvr>
     <a:masterClrMapping/>
   </p:clrMapOvr>
+  <p:timing>
+    <p:tnLst>
+      <p:par>
+        <p:cTn id="1" dur="indefinite" restart="never" nodeType="tmRoot"/>
+      </p:par>
+    </p:tnLst>
+  </p:timing>
 </p:sld>
 </file>
 
@@ -5469,250 +5653,6 @@
                   <a:srgbClr val="002060"/>
                 </a:solidFill>
               </a:rPr>
-              <a:t>Lab #8: Register read ports</a:t>
-            </a:r>
-          </a:p>
-        </p:txBody>
-      </p:sp>
-      <p:sp>
-        <p:nvSpPr>
-          <p:cNvPr id="37" name="TextBox 36">
-            <a:extLst>
-              <a:ext uri="{FF2B5EF4-FFF2-40B4-BE49-F238E27FC236}">
-                <a16:creationId xmlns:a16="http://schemas.microsoft.com/office/drawing/2014/main" id="{8C74D9A1-217A-4EB4-8E17-EF17B6598F01}"/>
-              </a:ext>
-            </a:extLst>
-          </p:cNvPr>
-          <p:cNvSpPr txBox="1"/>
-          <p:nvPr/>
-        </p:nvSpPr>
-        <p:spPr>
-          <a:xfrm>
-            <a:off x="329184" y="553998"/>
-            <a:ext cx="7545247" cy="1200329"/>
-          </a:xfrm>
-          <a:prstGeom prst="rect">
-            <a:avLst/>
-          </a:prstGeom>
-        </p:spPr>
-        <p:txBody>
-          <a:bodyPr wrap="square" rtlCol="0">
-            <a:spAutoFit/>
-          </a:bodyPr>
-          <a:lstStyle/>
-          <a:p>
-            <a:r>
-              <a:rPr lang="en-US" sz="2400" dirty="0"/>
-              <a:t>From slide 8 in slide deck #17: </a:t>
-            </a:r>
-          </a:p>
-          <a:p>
-            <a:endParaRPr lang="en-US" sz="2400" dirty="0"/>
-          </a:p>
-          <a:p>
-            <a:endParaRPr lang="en-US" sz="2400" dirty="0"/>
-          </a:p>
-        </p:txBody>
-      </p:sp>
-      <p:pic>
-        <p:nvPicPr>
-          <p:cNvPr id="3" name="Picture 2" descr="17 - The Register File and ALU  -  Protected View - PowerPoint">
-            <a:extLst>
-              <a:ext uri="{FF2B5EF4-FFF2-40B4-BE49-F238E27FC236}">
-                <a16:creationId xmlns:a16="http://schemas.microsoft.com/office/drawing/2014/main" id="{AB72AC94-3290-4496-A95F-EB657F6854EB}"/>
-              </a:ext>
-            </a:extLst>
-          </p:cNvPr>
-          <p:cNvPicPr>
-            <a:picLocks noChangeAspect="1"/>
-          </p:cNvPicPr>
-          <p:nvPr/>
-        </p:nvPicPr>
-        <p:blipFill rotWithShape="1">
-          <a:blip r:embed="rId3">
-            <a:extLst>
-              <a:ext uri="{28A0092B-C50C-407E-A947-70E740481C1C}">
-                <a14:useLocalDpi xmlns:a14="http://schemas.microsoft.com/office/drawing/2010/main" val="0"/>
-              </a:ext>
-            </a:extLst>
-          </a:blip>
-          <a:srcRect l="23867" t="25096" r="10666" b="13412"/>
-          <a:stretch/>
-        </p:blipFill>
-        <p:spPr>
-          <a:xfrm>
-            <a:off x="243840" y="1154162"/>
-            <a:ext cx="5986272" cy="3048000"/>
-          </a:xfrm>
-          <a:prstGeom prst="rect">
-            <a:avLst/>
-          </a:prstGeom>
-        </p:spPr>
-      </p:pic>
-      <p:sp>
-        <p:nvSpPr>
-          <p:cNvPr id="38" name="TextBox 37">
-            <a:extLst>
-              <a:ext uri="{FF2B5EF4-FFF2-40B4-BE49-F238E27FC236}">
-                <a16:creationId xmlns:a16="http://schemas.microsoft.com/office/drawing/2014/main" id="{0F466B88-62F0-4BB8-893A-268FCAD012D5}"/>
-              </a:ext>
-            </a:extLst>
-          </p:cNvPr>
-          <p:cNvSpPr txBox="1"/>
-          <p:nvPr/>
-        </p:nvSpPr>
-        <p:spPr>
-          <a:xfrm>
-            <a:off x="329184" y="4509939"/>
-            <a:ext cx="7918987" cy="1785104"/>
-          </a:xfrm>
-          <a:prstGeom prst="rect">
-            <a:avLst/>
-          </a:prstGeom>
-          <a:noFill/>
-        </p:spPr>
-        <p:txBody>
-          <a:bodyPr wrap="square" rtlCol="0">
-            <a:spAutoFit/>
-          </a:bodyPr>
-          <a:lstStyle/>
-          <a:p>
-            <a:r>
-              <a:rPr lang="en-US" sz="2200" b="1" u="sng" dirty="0">
-                <a:solidFill>
-                  <a:srgbClr val="002060"/>
-                </a:solidFill>
-              </a:rPr>
-              <a:t>Differences for this lab</a:t>
-            </a:r>
-            <a:r>
-              <a:rPr lang="en-US" sz="2200" dirty="0">
-                <a:solidFill>
-                  <a:srgbClr val="002060"/>
-                </a:solidFill>
-              </a:rPr>
-              <a:t>:</a:t>
-            </a:r>
-          </a:p>
-          <a:p>
-            <a:pPr marL="342900" indent="-342900">
-              <a:buFont typeface="Arial" panose="020B0604020202020204" pitchFamily="34" charset="0"/>
-              <a:buChar char="•"/>
-            </a:pPr>
-            <a:r>
-              <a:rPr lang="en-US" sz="2200" dirty="0">
-                <a:solidFill>
-                  <a:srgbClr val="002060"/>
-                </a:solidFill>
-              </a:rPr>
-              <a:t>You’ll need two of these.</a:t>
-            </a:r>
-          </a:p>
-          <a:p>
-            <a:pPr marL="342900" indent="-342900">
-              <a:buFont typeface="Arial" panose="020B0604020202020204" pitchFamily="34" charset="0"/>
-              <a:buChar char="•"/>
-            </a:pPr>
-            <a:r>
-              <a:rPr lang="en-US" sz="2200" dirty="0">
-                <a:solidFill>
-                  <a:srgbClr val="002060"/>
-                </a:solidFill>
-              </a:rPr>
-              <a:t>There will be 8 registers.  The bit width of the select bits attribute of the MUX will need to be wide enough to uniquely specify the 8 registers (= the width of </a:t>
-            </a:r>
-            <a:r>
-              <a:rPr lang="en-US" sz="2200" dirty="0" err="1">
-                <a:solidFill>
-                  <a:srgbClr val="002060"/>
-                </a:solidFill>
-              </a:rPr>
-              <a:t>rs</a:t>
-            </a:r>
-            <a:r>
-              <a:rPr lang="en-US" sz="2200" dirty="0">
-                <a:solidFill>
-                  <a:srgbClr val="002060"/>
-                </a:solidFill>
-              </a:rPr>
-              <a:t> and </a:t>
-            </a:r>
-            <a:r>
-              <a:rPr lang="en-US" sz="2200" dirty="0" err="1">
-                <a:solidFill>
-                  <a:srgbClr val="002060"/>
-                </a:solidFill>
-              </a:rPr>
-              <a:t>rd</a:t>
-            </a:r>
-            <a:r>
-              <a:rPr lang="en-US" sz="2200" dirty="0">
-                <a:solidFill>
-                  <a:srgbClr val="002060"/>
-                </a:solidFill>
-              </a:rPr>
-              <a:t>).   </a:t>
-            </a:r>
-          </a:p>
-        </p:txBody>
-      </p:sp>
-    </p:spTree>
-    <p:extLst>
-      <p:ext uri="{BB962C8B-B14F-4D97-AF65-F5344CB8AC3E}">
-        <p14:creationId xmlns:p14="http://schemas.microsoft.com/office/powerpoint/2010/main" val="3743737944"/>
-      </p:ext>
-    </p:extLst>
-  </p:cSld>
-  <p:clrMapOvr>
-    <a:masterClrMapping/>
-  </p:clrMapOvr>
-</p:sld>
-</file>
-
-<file path=ppt/slides/slide8.xml><?xml version="1.0" encoding="utf-8"?>
-<p:sld xmlns:a="http://schemas.openxmlformats.org/drawingml/2006/main" xmlns:r="http://schemas.openxmlformats.org/officeDocument/2006/relationships" xmlns:p="http://schemas.openxmlformats.org/presentationml/2006/main">
-  <p:cSld>
-    <p:spTree>
-      <p:nvGrpSpPr>
-        <p:cNvPr id="1" name=""/>
-        <p:cNvGrpSpPr/>
-        <p:nvPr/>
-      </p:nvGrpSpPr>
-      <p:grpSpPr>
-        <a:xfrm>
-          <a:off x="0" y="0"/>
-          <a:ext cx="0" cy="0"/>
-          <a:chOff x="0" y="0"/>
-          <a:chExt cx="0" cy="0"/>
-        </a:xfrm>
-      </p:grpSpPr>
-      <p:sp>
-        <p:nvSpPr>
-          <p:cNvPr id="5" name="TextBox 4"/>
-          <p:cNvSpPr txBox="1"/>
-          <p:nvPr/>
-        </p:nvSpPr>
-        <p:spPr>
-          <a:xfrm>
-            <a:off x="-1" y="0"/>
-            <a:ext cx="8601740" cy="553998"/>
-          </a:xfrm>
-          <a:prstGeom prst="rect">
-            <a:avLst/>
-          </a:prstGeom>
-        </p:spPr>
-        <p:txBody>
-          <a:bodyPr wrap="square" rtlCol="0">
-            <a:spAutoFit/>
-          </a:bodyPr>
-          <a:lstStyle/>
-          <a:p>
-            <a:r>
-              <a:rPr lang="en-US" sz="3000" dirty="0">
-                <a:solidFill>
-                  <a:srgbClr val="002060"/>
-                </a:solidFill>
-              </a:rPr>
               <a:t>Lab #8: Register write port</a:t>
             </a:r>
           </a:p>
@@ -5814,7 +5754,23 @@
                   <a:srgbClr val="002060"/>
                 </a:solidFill>
               </a:rPr>
-              <a:t>The components is a demultiplexer.</a:t>
+              <a:t>The </a:t>
+            </a:r>
+            <a:r>
+              <a:rPr lang="en-US" sz="2200" dirty="0" smtClean="0">
+                <a:solidFill>
+                  <a:srgbClr val="002060"/>
+                </a:solidFill>
+              </a:rPr>
+              <a:t>trapezoid-shaped component </a:t>
+            </a:r>
+            <a:r>
+              <a:rPr lang="en-US" sz="2200" dirty="0">
+                <a:solidFill>
+                  <a:srgbClr val="002060"/>
+                </a:solidFill>
+              </a:rPr>
+              <a:t>is a demultiplexer.</a:t>
             </a:r>
           </a:p>
           <a:p>
@@ -5842,21 +5798,69 @@
                   <a:srgbClr val="002060"/>
                 </a:solidFill>
               </a:rPr>
-              <a:t>Make sure to adjust selection bits width on the DMX</a:t>
-            </a:r>
-          </a:p>
-          <a:p>
-            <a:pPr marL="342900" indent="-342900">
-              <a:buFont typeface="Arial" panose="020B0604020202020204" pitchFamily="34" charset="0"/>
-              <a:buChar char="•"/>
-            </a:pPr>
+              <a:t>Make sure to </a:t>
+            </a:r>
+            <a:r>
+              <a:rPr lang="en-US" sz="2200" dirty="0" smtClean="0">
+                <a:solidFill>
+                  <a:srgbClr val="002060"/>
+                </a:solidFill>
+              </a:rPr>
+              <a:t>adjust the </a:t>
+            </a:r>
             <a:r>
               <a:rPr lang="en-US" sz="2200" dirty="0">
                 <a:solidFill>
                   <a:srgbClr val="002060"/>
                 </a:solidFill>
               </a:rPr>
-              <a:t>The input to the selection pin will determine which register is chosen for the write.</a:t>
+              <a:t>selection bits width on the DMX</a:t>
+            </a:r>
+          </a:p>
+          <a:p>
+            <a:pPr marL="342900" indent="-342900">
+              <a:buFont typeface="Arial" panose="020B0604020202020204" pitchFamily="34" charset="0"/>
+              <a:buChar char="•"/>
+            </a:pPr>
+            <a:r>
+              <a:rPr lang="en-US" sz="2200" dirty="0">
+                <a:solidFill>
+                  <a:srgbClr val="002060"/>
+                </a:solidFill>
+              </a:rPr>
+              <a:t>The input to the selection </a:t>
+            </a:r>
+            <a:r>
+              <a:rPr lang="en-US" sz="2200" dirty="0" smtClean="0">
+                <a:solidFill>
+                  <a:srgbClr val="002060"/>
+                </a:solidFill>
+              </a:rPr>
+              <a:t>pin (</a:t>
+            </a:r>
+            <a:r>
+              <a:rPr lang="en-US" sz="2200" dirty="0" err="1" smtClean="0">
+                <a:solidFill>
+                  <a:srgbClr val="002060"/>
+                </a:solidFill>
+              </a:rPr>
+              <a:t>rt</a:t>
+            </a:r>
+            <a:r>
+              <a:rPr lang="en-US" sz="2200" dirty="0" smtClean="0">
+                <a:solidFill>
+                  <a:srgbClr val="002060"/>
+                </a:solidFill>
+              </a:rPr>
+              <a:t>) </a:t>
+            </a:r>
+            <a:r>
+              <a:rPr lang="en-US" sz="2200" dirty="0">
+                <a:solidFill>
+                  <a:srgbClr val="002060"/>
+                </a:solidFill>
+              </a:rPr>
+              <a:t>will determine which register is chosen for the write.</a:t>
             </a:r>
           </a:p>
         </p:txBody>
@@ -5906,6 +5910,251 @@
   <p:clrMapOvr>
     <a:masterClrMapping/>
   </p:clrMapOvr>
+  <p:timing>
+    <p:tnLst>
+      <p:par>
+        <p:cTn id="1" dur="indefinite" restart="never" nodeType="tmRoot"/>
+      </p:par>
+    </p:tnLst>
+  </p:timing>
+</p:sld>
+</file>
+
+<file path=ppt/slides/slide8.xml><?xml version="1.0" encoding="utf-8"?>
+<p:sld xmlns:a="http://schemas.openxmlformats.org/drawingml/2006/main" xmlns:r="http://schemas.openxmlformats.org/officeDocument/2006/relationships" xmlns:p="http://schemas.openxmlformats.org/presentationml/2006/main">
+  <p:cSld>
+    <p:spTree>
+      <p:nvGrpSpPr>
+        <p:cNvPr id="1" name=""/>
+        <p:cNvGrpSpPr/>
+        <p:nvPr/>
+      </p:nvGrpSpPr>
+      <p:grpSpPr>
+        <a:xfrm>
+          <a:off x="0" y="0"/>
+          <a:ext cx="0" cy="0"/>
+          <a:chOff x="0" y="0"/>
+          <a:chExt cx="0" cy="0"/>
+        </a:xfrm>
+      </p:grpSpPr>
+      <p:sp>
+        <p:nvSpPr>
+          <p:cNvPr id="5" name="TextBox 4"/>
+          <p:cNvSpPr txBox="1"/>
+          <p:nvPr/>
+        </p:nvSpPr>
+        <p:spPr>
+          <a:xfrm>
+            <a:off x="-1" y="0"/>
+            <a:ext cx="8601740" cy="553998"/>
+          </a:xfrm>
+          <a:prstGeom prst="rect">
+            <a:avLst/>
+          </a:prstGeom>
+        </p:spPr>
+        <p:txBody>
+          <a:bodyPr wrap="square" rtlCol="0">
+            <a:spAutoFit/>
+          </a:bodyPr>
+          <a:lstStyle/>
+          <a:p>
+            <a:r>
+              <a:rPr lang="en-US" sz="3000" dirty="0">
+                <a:solidFill>
+                  <a:srgbClr val="002060"/>
+                </a:solidFill>
+              </a:rPr>
+              <a:t>Lab #8: Making adjustments to register 7 (r7)</a:t>
+            </a:r>
+          </a:p>
+        </p:txBody>
+      </p:sp>
+      <p:sp>
+        <p:nvSpPr>
+          <p:cNvPr id="37" name="TextBox 36">
+            <a:extLst>
+              <a:ext uri="{FF2B5EF4-FFF2-40B4-BE49-F238E27FC236}">
+                <a16:creationId xmlns:a16="http://schemas.microsoft.com/office/drawing/2014/main" id="{8C74D9A1-217A-4EB4-8E17-EF17B6598F01}"/>
+              </a:ext>
+            </a:extLst>
+          </p:cNvPr>
+          <p:cNvSpPr txBox="1"/>
+          <p:nvPr/>
+        </p:nvSpPr>
+        <p:spPr>
+          <a:xfrm>
+            <a:off x="633984" y="800100"/>
+            <a:ext cx="7545247" cy="5262979"/>
+          </a:xfrm>
+          <a:prstGeom prst="rect">
+            <a:avLst/>
+          </a:prstGeom>
+        </p:spPr>
+        <p:txBody>
+          <a:bodyPr wrap="square" rtlCol="0">
+            <a:spAutoFit/>
+          </a:bodyPr>
+          <a:lstStyle/>
+          <a:p>
+            <a:pPr marL="342900" indent="-342900">
+              <a:buFont typeface="Arial" panose="020B0604020202020204" pitchFamily="34" charset="0"/>
+              <a:buChar char="•"/>
+            </a:pPr>
+            <a:r>
+              <a:rPr lang="en-US" sz="2200" dirty="0"/>
+              <a:t>This register will be designed to do post- and </a:t>
+            </a:r>
+            <a:r>
+              <a:rPr lang="en-US" sz="2200" dirty="0" smtClean="0"/>
+              <a:t>pre-increments, but only when requested.</a:t>
+            </a:r>
+          </a:p>
+          <a:p>
+            <a:pPr marL="800100" lvl="1" indent="-342900">
+              <a:buFont typeface="Arial" panose="020B0604020202020204" pitchFamily="34" charset="0"/>
+              <a:buChar char="•"/>
+            </a:pPr>
+            <a:r>
+              <a:rPr lang="en-US" sz="2200" dirty="0" smtClean="0"/>
+              <a:t>Otherwise it will behave normally.</a:t>
+            </a:r>
+            <a:endParaRPr lang="en-US" sz="2200" dirty="0"/>
+          </a:p>
+          <a:p>
+            <a:endParaRPr lang="en-US" sz="2200" dirty="0"/>
+          </a:p>
+          <a:p>
+            <a:pPr marL="342900" indent="-342900">
+              <a:buFont typeface="Arial" panose="020B0604020202020204" pitchFamily="34" charset="0"/>
+              <a:buChar char="•"/>
+            </a:pPr>
+            <a:r>
+              <a:rPr lang="en-US" sz="2200" dirty="0"/>
+              <a:t>The incr7 and decr7 pins will control this behavior.</a:t>
+            </a:r>
+          </a:p>
+          <a:p>
+            <a:pPr marL="342900" indent="-342900">
+              <a:buFont typeface="Arial" panose="020B0604020202020204" pitchFamily="34" charset="0"/>
+              <a:buChar char="•"/>
+            </a:pPr>
+            <a:endParaRPr lang="en-US" sz="2200" dirty="0"/>
+          </a:p>
+          <a:p>
+            <a:pPr marL="342900" indent="-342900">
+              <a:buFont typeface="Arial" panose="020B0604020202020204" pitchFamily="34" charset="0"/>
+              <a:buChar char="•"/>
+            </a:pPr>
+            <a:r>
+              <a:rPr lang="en-US" sz="2200" dirty="0"/>
+              <a:t>If incr7 = 1, then </a:t>
+            </a:r>
+            <a:endParaRPr lang="en-US" sz="2200" dirty="0" smtClean="0"/>
+          </a:p>
+          <a:p>
+            <a:pPr marL="800100" lvl="1" indent="-342900">
+              <a:buFont typeface="Arial" panose="020B0604020202020204" pitchFamily="34" charset="0"/>
+              <a:buChar char="•"/>
+            </a:pPr>
+            <a:r>
+              <a:rPr lang="en-US" sz="2200" dirty="0" smtClean="0"/>
+              <a:t>writes to r7 should be enabled</a:t>
+            </a:r>
+          </a:p>
+          <a:p>
+            <a:pPr marL="1257300" lvl="2" indent="-342900">
+              <a:buFont typeface="Arial" panose="020B0604020202020204" pitchFamily="34" charset="0"/>
+              <a:buChar char="•"/>
+            </a:pPr>
+            <a:r>
+              <a:rPr lang="en-US" sz="2200" dirty="0" smtClean="0"/>
+              <a:t>Even if r7 is not selected as the </a:t>
+            </a:r>
+            <a:r>
+              <a:rPr lang="en-US" sz="2200" dirty="0" err="1" smtClean="0"/>
+              <a:t>rd</a:t>
+            </a:r>
+            <a:endParaRPr lang="en-US" sz="2200" dirty="0" smtClean="0"/>
+          </a:p>
+          <a:p>
+            <a:pPr marL="1257300" lvl="2" indent="-342900">
+              <a:buFont typeface="Arial" panose="020B0604020202020204" pitchFamily="34" charset="0"/>
+              <a:buChar char="•"/>
+            </a:pPr>
+            <a:r>
+              <a:rPr lang="en-US" sz="2200" dirty="0" smtClean="0"/>
+              <a:t>Even if the write enable input pin = 0</a:t>
+            </a:r>
+            <a:endParaRPr lang="en-US" sz="2200" dirty="0"/>
+          </a:p>
+          <a:p>
+            <a:pPr marL="800100" lvl="1" indent="-342900">
+              <a:buFont typeface="Arial" panose="020B0604020202020204" pitchFamily="34" charset="0"/>
+              <a:buChar char="•"/>
+            </a:pPr>
+            <a:r>
+              <a:rPr lang="en-US" sz="2200" dirty="0" smtClean="0"/>
+              <a:t>the </a:t>
+            </a:r>
+            <a:r>
+              <a:rPr lang="en-US" sz="2200" dirty="0"/>
+              <a:t>value in r7 should be incremented </a:t>
+            </a:r>
+            <a:r>
+              <a:rPr lang="en-US" sz="2200" dirty="0" smtClean="0"/>
+              <a:t>to r7 + 1</a:t>
+            </a:r>
+            <a:endParaRPr lang="en-US" sz="2200" dirty="0"/>
+          </a:p>
+          <a:p>
+            <a:pPr marL="800100" lvl="1" indent="-342900">
+              <a:buFont typeface="Arial" panose="020B0604020202020204" pitchFamily="34" charset="0"/>
+              <a:buChar char="•"/>
+            </a:pPr>
+            <a:r>
+              <a:rPr lang="en-US" sz="2200" dirty="0" smtClean="0"/>
+              <a:t>the data input should be ignored</a:t>
+            </a:r>
+            <a:endParaRPr lang="en-US" dirty="0"/>
+          </a:p>
+          <a:p>
+            <a:endParaRPr lang="en-US" dirty="0"/>
+          </a:p>
+          <a:p>
+            <a:r>
+              <a:rPr lang="en-US" dirty="0"/>
+              <a:t> </a:t>
+            </a:r>
+          </a:p>
+          <a:p>
+            <a:pPr marL="457200" indent="-457200">
+              <a:buFont typeface="+mj-lt"/>
+              <a:buAutoNum type="arabicPeriod"/>
+            </a:pPr>
+            <a:endParaRPr lang="en-US" dirty="0"/>
+          </a:p>
+          <a:p>
+            <a:endParaRPr lang="en-US" dirty="0"/>
+          </a:p>
+        </p:txBody>
+      </p:sp>
+    </p:spTree>
+    <p:extLst>
+      <p:ext uri="{BB962C8B-B14F-4D97-AF65-F5344CB8AC3E}">
+        <p14:creationId xmlns:p14="http://schemas.microsoft.com/office/powerpoint/2010/main" val="2885050249"/>
+      </p:ext>
+    </p:extLst>
+  </p:cSld>
+  <p:clrMapOvr>
+    <a:masterClrMapping/>
+  </p:clrMapOvr>
+  <p:timing>
+    <p:tnLst>
+      <p:par>
+        <p:cTn id="1" dur="indefinite" restart="never" nodeType="tmRoot"/>
+      </p:par>
+    </p:tnLst>
+  </p:timing>
 </p:sld>
 </file>
 
@@ -5973,7 +6222,7 @@
         <p:spPr>
           <a:xfrm>
             <a:off x="633984" y="800100"/>
-            <a:ext cx="7545247" cy="7355860"/>
+            <a:ext cx="7545247" cy="5539978"/>
           </a:xfrm>
           <a:prstGeom prst="rect">
             <a:avLst/>
@@ -5990,67 +6239,16 @@
               <a:buChar char="•"/>
             </a:pPr>
             <a:r>
+              <a:rPr lang="en-US" sz="2200" dirty="0" smtClean="0"/>
+              <a:t>If decr7 </a:t>
+            </a:r>
+            <a:r>
               <a:rPr lang="en-US" sz="2200" dirty="0"/>
-              <a:t>This register will be designed to do post- and pre-increments.</a:t>
-            </a:r>
-          </a:p>
-          <a:p>
-            <a:endParaRPr lang="en-US" sz="2200" dirty="0"/>
-          </a:p>
-          <a:p>
-            <a:pPr marL="342900" indent="-342900">
-              <a:buFont typeface="Arial" panose="020B0604020202020204" pitchFamily="34" charset="0"/>
-              <a:buChar char="•"/>
-            </a:pPr>
-            <a:r>
-              <a:rPr lang="en-US" sz="2200" dirty="0"/>
-              <a:t>The incr7 and decr7 pins will control this behavior.</a:t>
-            </a:r>
-          </a:p>
-          <a:p>
-            <a:pPr marL="342900" indent="-342900">
-              <a:buFont typeface="Arial" panose="020B0604020202020204" pitchFamily="34" charset="0"/>
-              <a:buChar char="•"/>
-            </a:pPr>
-            <a:endParaRPr lang="en-US" sz="2200" dirty="0"/>
-          </a:p>
-          <a:p>
-            <a:pPr marL="342900" indent="-342900">
-              <a:buFont typeface="Arial" panose="020B0604020202020204" pitchFamily="34" charset="0"/>
-              <a:buChar char="•"/>
-            </a:pPr>
-            <a:r>
-              <a:rPr lang="en-US" sz="2200" dirty="0"/>
-              <a:t>If incr7 = 1, then ‘write enable’ for r7 should be turned on, and the value in r7 should be incremented by 1 (even if r7 is not selected as the </a:t>
-            </a:r>
-            <a:r>
-              <a:rPr lang="en-US" sz="2200" dirty="0" err="1"/>
-              <a:t>rd</a:t>
-            </a:r>
-            <a:r>
-              <a:rPr lang="en-US" sz="2200" dirty="0"/>
-              <a:t>).</a:t>
-            </a:r>
-          </a:p>
-          <a:p>
-            <a:endParaRPr lang="en-US" sz="2200" dirty="0"/>
-          </a:p>
-          <a:p>
-            <a:pPr marL="342900" indent="-342900">
-              <a:buFont typeface="Arial" panose="020B0604020202020204" pitchFamily="34" charset="0"/>
-              <a:buChar char="•"/>
-            </a:pPr>
-            <a:r>
-              <a:rPr lang="en-US" sz="2200" dirty="0"/>
-              <a:t>If decr7 = 1, then ‘write enable’ for r7 should be turned on, and the value in r7 should be decremented by 1 (even if r7 is not selected as the </a:t>
-            </a:r>
-            <a:r>
-              <a:rPr lang="en-US" sz="2200" dirty="0" err="1"/>
-              <a:t>rd</a:t>
-            </a:r>
-            <a:r>
-              <a:rPr lang="en-US" sz="2200" dirty="0"/>
-              <a:t>).</a:t>
+              <a:t>= 1, </a:t>
+            </a:r>
+            <a:r>
+              <a:rPr lang="en-US" sz="2200" dirty="0" smtClean="0"/>
+              <a:t>then:</a:t>
             </a:r>
           </a:p>
           <a:p>
@@ -6059,9 +6257,44 @@
               <a:buChar char="•"/>
             </a:pPr>
             <a:r>
+              <a:rPr lang="en-US" sz="2200" dirty="0" smtClean="0"/>
+              <a:t> </a:t>
+            </a:r>
+            <a:r>
+              <a:rPr lang="en-US" sz="2200" dirty="0" smtClean="0"/>
+              <a:t>writes to r7 should be enabled,</a:t>
+            </a:r>
+            <a:endParaRPr lang="en-US" sz="2200" dirty="0"/>
+          </a:p>
+          <a:p>
+            <a:pPr marL="1257300" lvl="2" indent="-342900">
+              <a:buFont typeface="Arial" panose="020B0604020202020204" pitchFamily="34" charset="0"/>
+              <a:buChar char="•"/>
+            </a:pPr>
+            <a:r>
               <a:rPr lang="en-US" sz="2200" dirty="0"/>
-              <a:t>The output of r7 should be r7 – 1</a:t>
-            </a:r>
+              <a:t>even if r7 is not selected as the </a:t>
+            </a:r>
+            <a:r>
+              <a:rPr lang="en-US" sz="2200" dirty="0" err="1" smtClean="0"/>
+              <a:t>rd</a:t>
+            </a:r>
+            <a:endParaRPr lang="en-US" sz="2200" dirty="0"/>
+          </a:p>
+          <a:p>
+            <a:pPr marL="1257300" lvl="2" indent="-342900">
+              <a:buFont typeface="Arial" panose="020B0604020202020204" pitchFamily="34" charset="0"/>
+              <a:buChar char="•"/>
+            </a:pPr>
+            <a:r>
+              <a:rPr lang="en-US" sz="2200" dirty="0" smtClean="0"/>
+              <a:t>Even if </a:t>
+            </a:r>
+            <a:r>
+              <a:rPr lang="en-US" sz="2200" dirty="0"/>
+              <a:t>the write enable input pin = 0</a:t>
+            </a:r>
+            <a:endParaRPr lang="en-US" sz="2200" dirty="0" smtClean="0"/>
           </a:p>
           <a:p>
             <a:pPr marL="800100" lvl="1" indent="-342900">
@@ -6069,73 +6302,117 @@
               <a:buChar char="•"/>
             </a:pPr>
             <a:r>
+              <a:rPr lang="en-US" sz="2200" dirty="0" smtClean="0"/>
+              <a:t>the </a:t>
+            </a:r>
+            <a:r>
               <a:rPr lang="en-US" sz="2200" dirty="0"/>
-              <a:t>This is analogous to </a:t>
-            </a:r>
-            <a:r>
-              <a:rPr lang="en-US" sz="2200" dirty="0" err="1"/>
-              <a:t>predecrement</a:t>
-            </a:r>
-            <a:r>
-              <a:rPr lang="en-US" sz="2200" dirty="0"/>
-              <a:t> in other programming languages (i.e., --x).</a:t>
-            </a:r>
-          </a:p>
-          <a:p>
-            <a:pPr marL="800100" lvl="1" indent="-342900">
+              <a:t>value in r7 should be </a:t>
+            </a:r>
+            <a:r>
+              <a:rPr lang="en-US" sz="2200" dirty="0" smtClean="0"/>
+              <a:t>de</a:t>
+            </a:r>
+            <a:r>
+              <a:rPr lang="en-US" sz="2200" dirty="0" smtClean="0"/>
+              <a:t>cremented </a:t>
+            </a:r>
+            <a:r>
+              <a:rPr lang="en-US" sz="2200" dirty="0" smtClean="0"/>
+              <a:t>to r7 - 1</a:t>
+            </a:r>
+            <a:endParaRPr lang="en-US" sz="2200" dirty="0"/>
+          </a:p>
+          <a:p>
+            <a:pPr marL="1257300" lvl="2" indent="-342900">
               <a:buFont typeface="Arial" panose="020B0604020202020204" pitchFamily="34" charset="0"/>
               <a:buChar char="•"/>
             </a:pPr>
-            <a:endParaRPr lang="en-US" sz="2200" dirty="0"/>
-          </a:p>
-          <a:p>
-            <a:pPr marL="342900" indent="-342900">
+            <a:r>
+              <a:rPr lang="en-US" sz="2200" dirty="0" smtClean="0"/>
+              <a:t>the data input should be ignored</a:t>
+            </a:r>
+            <a:endParaRPr lang="en-US" sz="2200" dirty="0" smtClean="0"/>
+          </a:p>
+          <a:p>
+            <a:endParaRPr lang="en-US" sz="2200" dirty="0" smtClean="0"/>
+          </a:p>
+          <a:p>
+            <a:pPr marL="285750" indent="-285750">
               <a:buFont typeface="Arial" panose="020B0604020202020204" pitchFamily="34" charset="0"/>
               <a:buChar char="•"/>
             </a:pPr>
             <a:r>
-              <a:rPr lang="en-US" sz="2200" dirty="0"/>
-              <a:t>If incr7 = 0 and decr7 = 0, r7 behaves like a normal register.</a:t>
-            </a:r>
-          </a:p>
-          <a:p>
-            <a:pPr marL="342900" indent="-342900">
+              <a:rPr lang="en-US" sz="2200" u="sng" dirty="0" smtClean="0"/>
+              <a:t>In addition</a:t>
+            </a:r>
+            <a:r>
+              <a:rPr lang="en-US" sz="2200" dirty="0" smtClean="0"/>
+              <a:t>, the output from decr7 should be updated to r7-1 immediately.</a:t>
+            </a:r>
+          </a:p>
+          <a:p>
+            <a:pPr marL="742950" lvl="1" indent="-285750">
               <a:buFont typeface="Arial" panose="020B0604020202020204" pitchFamily="34" charset="0"/>
               <a:buChar char="•"/>
             </a:pPr>
-            <a:endParaRPr lang="en-US" sz="2400" dirty="0"/>
-          </a:p>
-          <a:p>
-            <a:endParaRPr lang="en-US" sz="2400" dirty="0"/>
-          </a:p>
-          <a:p>
-            <a:r>
-              <a:rPr lang="en-US" sz="2400" dirty="0"/>
-              <a:t> </a:t>
-            </a:r>
+            <a:r>
+              <a:rPr lang="en-US" sz="2000" dirty="0"/>
+              <a:t>This is analogous to </a:t>
+            </a:r>
+            <a:r>
+              <a:rPr lang="en-US" sz="2000" dirty="0" err="1"/>
+              <a:t>predecrement</a:t>
+            </a:r>
+            <a:r>
+              <a:rPr lang="en-US" sz="2000" dirty="0"/>
+              <a:t> in other programming languages (i.e., --x</a:t>
+            </a:r>
+            <a:r>
+              <a:rPr lang="en-US" sz="2000" dirty="0" smtClean="0"/>
+              <a:t>).</a:t>
+            </a:r>
+          </a:p>
+          <a:p>
+            <a:pPr marL="742950" lvl="1" indent="-285750">
+              <a:buFont typeface="Arial" panose="020B0604020202020204" pitchFamily="34" charset="0"/>
+              <a:buChar char="•"/>
+            </a:pPr>
+            <a:r>
+              <a:rPr lang="en-US" sz="2000" dirty="0" smtClean="0"/>
+              <a:t>For your circuit, this implies that you will need to add logic to determine whether the current register’s contents (r7) or the register’s content minus 1 (r7-1) should be sent to the read ports.</a:t>
+            </a:r>
+            <a:endParaRPr lang="en-US" dirty="0"/>
           </a:p>
           <a:p>
             <a:pPr marL="457200" indent="-457200">
               <a:buFont typeface="+mj-lt"/>
               <a:buAutoNum type="arabicPeriod"/>
             </a:pPr>
-            <a:endParaRPr lang="en-US" sz="2400" dirty="0"/>
-          </a:p>
-          <a:p>
-            <a:endParaRPr lang="en-US" sz="2400" dirty="0"/>
+            <a:endParaRPr lang="en-US" dirty="0"/>
+          </a:p>
+          <a:p>
+            <a:endParaRPr lang="en-US" dirty="0"/>
           </a:p>
         </p:txBody>
       </p:sp>
     </p:spTree>
     <p:extLst>
       <p:ext uri="{BB962C8B-B14F-4D97-AF65-F5344CB8AC3E}">
-        <p14:creationId xmlns:p14="http://schemas.microsoft.com/office/powerpoint/2010/main" val="2885050249"/>
+        <p14:creationId xmlns:p14="http://schemas.microsoft.com/office/powerpoint/2010/main" val="145988052"/>
       </p:ext>
     </p:extLst>
   </p:cSld>
   <p:clrMapOvr>
     <a:masterClrMapping/>
   </p:clrMapOvr>
+  <p:timing>
+    <p:tnLst>
+      <p:par>
+        <p:cTn id="1" dur="indefinite" restart="never" nodeType="tmRoot"/>
+      </p:par>
+    </p:tnLst>
+  </p:timing>
 </p:sld>
 </file>
 

</xml_diff>

<commit_message>
made some edits and corrections
</commit_message>
<xml_diff>
--- a/cs447jb_rec6_mar30_and_apr2.pptx
+++ b/cs447jb_rec6_mar30_and_apr2.pptx
@@ -4392,7 +4392,7 @@
           <p:cNvPr id="37" name="TextBox 36">
             <a:extLst>
               <a:ext uri="{FF2B5EF4-FFF2-40B4-BE49-F238E27FC236}">
-                <a16:creationId xmlns:a16="http://schemas.microsoft.com/office/drawing/2014/main" id="{8C74D9A1-217A-4EB4-8E17-EF17B6598F01}"/>
+                <a16:creationId xmlns:a16="http://schemas.microsoft.com/office/drawing/2014/main" xmlns="" id="{8C74D9A1-217A-4EB4-8E17-EF17B6598F01}"/>
               </a:ext>
             </a:extLst>
           </p:cNvPr>
@@ -4476,7 +4476,19 @@
             </a:r>
             <a:r>
               <a:rPr lang="en-US" sz="2400" dirty="0" smtClean="0"/>
-              <a:t>even with write enable off.</a:t>
+              <a:t>even </a:t>
+            </a:r>
+            <a:r>
+              <a:rPr lang="en-US" sz="2400" dirty="0" smtClean="0"/>
+              <a:t>when the </a:t>
+            </a:r>
+            <a:r>
+              <a:rPr lang="en-US" sz="2400" dirty="0" smtClean="0"/>
+              <a:t>write enable </a:t>
+            </a:r>
+            <a:r>
+              <a:rPr lang="en-US" sz="2400" dirty="0" smtClean="0"/>
+              <a:t>pin = 0</a:t>
             </a:r>
             <a:endParaRPr lang="en-US" sz="2400" dirty="0"/>
           </a:p>
@@ -4504,8 +4516,29 @@
             </a:pPr>
             <a:r>
               <a:rPr lang="en-US" sz="2400" dirty="0"/>
-              <a:t> r7 should auto-decrement, even with write enable off</a:t>
-            </a:r>
+              <a:t> r7 should auto-decrement</a:t>
+            </a:r>
+            <a:r>
+              <a:rPr lang="en-US" sz="2400"/>
+              <a:t>, </a:t>
+            </a:r>
+            <a:r>
+              <a:rPr lang="en-US" sz="2400"/>
+              <a:t>even when the write enable pin </a:t>
+            </a:r>
+            <a:r>
+              <a:rPr lang="en-US" sz="2400"/>
+              <a:t>= </a:t>
+            </a:r>
+            <a:r>
+              <a:rPr lang="en-US" sz="2400" smtClean="0"/>
+              <a:t>0</a:t>
+            </a:r>
+            <a:r>
+              <a:rPr lang="en-US" sz="2400" smtClean="0"/>
+              <a:t> </a:t>
+            </a:r>
+            <a:endParaRPr lang="en-US" sz="2400" dirty="0" smtClean="0"/>
           </a:p>
           <a:p>
             <a:pPr marL="800100" lvl="1" indent="-342900">
@@ -4513,8 +4546,12 @@
               <a:buChar char="•"/>
             </a:pPr>
             <a:r>
+              <a:rPr lang="en-US" sz="2400" dirty="0" smtClean="0"/>
+              <a:t>On </a:t>
+            </a:r>
+            <a:r>
               <a:rPr lang="en-US" sz="2400" dirty="0"/>
-              <a:t>On the output pins, you should see the value </a:t>
+              <a:t>the output pins, you should see the value </a:t>
             </a:r>
             <a:r>
               <a:rPr lang="en-US" sz="2400" dirty="0" smtClean="0"/>
@@ -4826,7 +4863,7 @@
           <p:cNvPr id="7" name="TextBox 6">
             <a:extLst>
               <a:ext uri="{FF2B5EF4-FFF2-40B4-BE49-F238E27FC236}">
-                <a16:creationId xmlns:a16="http://schemas.microsoft.com/office/drawing/2014/main" id="{B2039F73-6404-4656-A887-D317A59E9F04}"/>
+                <a16:creationId xmlns:a16="http://schemas.microsoft.com/office/drawing/2014/main" xmlns="" id="{B2039F73-6404-4656-A887-D317A59E9F04}"/>
               </a:ext>
             </a:extLst>
           </p:cNvPr>
@@ -4965,7 +5002,7 @@
           <p:cNvPr id="7" name="TextBox 6">
             <a:extLst>
               <a:ext uri="{FF2B5EF4-FFF2-40B4-BE49-F238E27FC236}">
-                <a16:creationId xmlns:a16="http://schemas.microsoft.com/office/drawing/2014/main" id="{B2039F73-6404-4656-A887-D317A59E9F04}"/>
+                <a16:creationId xmlns:a16="http://schemas.microsoft.com/office/drawing/2014/main" xmlns="" id="{B2039F73-6404-4656-A887-D317A59E9F04}"/>
               </a:ext>
             </a:extLst>
           </p:cNvPr>
@@ -5014,7 +5051,7 @@
           <p:cNvPr id="3" name="Picture 2" descr="Lab 8: Making a register file - Mozilla Firefox">
             <a:extLst>
               <a:ext uri="{FF2B5EF4-FFF2-40B4-BE49-F238E27FC236}">
-                <a16:creationId xmlns:a16="http://schemas.microsoft.com/office/drawing/2014/main" id="{CFC9B0DB-762C-4D64-AE00-18DE09A07E04}"/>
+                <a16:creationId xmlns:a16="http://schemas.microsoft.com/office/drawing/2014/main" xmlns="" id="{CFC9B0DB-762C-4D64-AE00-18DE09A07E04}"/>
               </a:ext>
             </a:extLst>
           </p:cNvPr>
@@ -5049,7 +5086,7 @@
           <p:cNvPr id="4" name="TextBox 3">
             <a:extLst>
               <a:ext uri="{FF2B5EF4-FFF2-40B4-BE49-F238E27FC236}">
-                <a16:creationId xmlns:a16="http://schemas.microsoft.com/office/drawing/2014/main" id="{373E7904-793D-4717-A124-FBDC7DE88A28}"/>
+                <a16:creationId xmlns:a16="http://schemas.microsoft.com/office/drawing/2014/main" xmlns="" id="{373E7904-793D-4717-A124-FBDC7DE88A28}"/>
               </a:ext>
             </a:extLst>
           </p:cNvPr>
@@ -5190,7 +5227,7 @@
           <p:cNvPr id="7" name="TextBox 6">
             <a:extLst>
               <a:ext uri="{FF2B5EF4-FFF2-40B4-BE49-F238E27FC236}">
-                <a16:creationId xmlns:a16="http://schemas.microsoft.com/office/drawing/2014/main" id="{B2039F73-6404-4656-A887-D317A59E9F04}"/>
+                <a16:creationId xmlns:a16="http://schemas.microsoft.com/office/drawing/2014/main" xmlns="" id="{B2039F73-6404-4656-A887-D317A59E9F04}"/>
               </a:ext>
             </a:extLst>
           </p:cNvPr>
@@ -5346,7 +5383,7 @@
           <p:cNvPr id="37" name="TextBox 36">
             <a:extLst>
               <a:ext uri="{FF2B5EF4-FFF2-40B4-BE49-F238E27FC236}">
-                <a16:creationId xmlns:a16="http://schemas.microsoft.com/office/drawing/2014/main" id="{8C74D9A1-217A-4EB4-8E17-EF17B6598F01}"/>
+                <a16:creationId xmlns:a16="http://schemas.microsoft.com/office/drawing/2014/main" xmlns="" id="{8C74D9A1-217A-4EB4-8E17-EF17B6598F01}"/>
               </a:ext>
             </a:extLst>
           </p:cNvPr>
@@ -5386,7 +5423,7 @@
           <p:cNvPr id="3" name="Picture 2" descr="17 - The Register File and ALU  -  Protected View - PowerPoint">
             <a:extLst>
               <a:ext uri="{FF2B5EF4-FFF2-40B4-BE49-F238E27FC236}">
-                <a16:creationId xmlns:a16="http://schemas.microsoft.com/office/drawing/2014/main" id="{AB72AC94-3290-4496-A95F-EB657F6854EB}"/>
+                <a16:creationId xmlns:a16="http://schemas.microsoft.com/office/drawing/2014/main" xmlns="" id="{AB72AC94-3290-4496-A95F-EB657F6854EB}"/>
               </a:ext>
             </a:extLst>
           </p:cNvPr>
@@ -5421,7 +5458,7 @@
           <p:cNvPr id="38" name="TextBox 37">
             <a:extLst>
               <a:ext uri="{FF2B5EF4-FFF2-40B4-BE49-F238E27FC236}">
-                <a16:creationId xmlns:a16="http://schemas.microsoft.com/office/drawing/2014/main" id="{0F466B88-62F0-4BB8-893A-268FCAD012D5}"/>
+                <a16:creationId xmlns:a16="http://schemas.microsoft.com/office/drawing/2014/main" xmlns="" id="{0F466B88-62F0-4BB8-893A-268FCAD012D5}"/>
               </a:ext>
             </a:extLst>
           </p:cNvPr>
@@ -5663,7 +5700,7 @@
           <p:cNvPr id="37" name="TextBox 36">
             <a:extLst>
               <a:ext uri="{FF2B5EF4-FFF2-40B4-BE49-F238E27FC236}">
-                <a16:creationId xmlns:a16="http://schemas.microsoft.com/office/drawing/2014/main" id="{8C74D9A1-217A-4EB4-8E17-EF17B6598F01}"/>
+                <a16:creationId xmlns:a16="http://schemas.microsoft.com/office/drawing/2014/main" xmlns="" id="{8C74D9A1-217A-4EB4-8E17-EF17B6598F01}"/>
               </a:ext>
             </a:extLst>
           </p:cNvPr>
@@ -5703,7 +5740,7 @@
           <p:cNvPr id="38" name="TextBox 37">
             <a:extLst>
               <a:ext uri="{FF2B5EF4-FFF2-40B4-BE49-F238E27FC236}">
-                <a16:creationId xmlns:a16="http://schemas.microsoft.com/office/drawing/2014/main" id="{0F466B88-62F0-4BB8-893A-268FCAD012D5}"/>
+                <a16:creationId xmlns:a16="http://schemas.microsoft.com/office/drawing/2014/main" xmlns="" id="{0F466B88-62F0-4BB8-893A-268FCAD012D5}"/>
               </a:ext>
             </a:extLst>
           </p:cNvPr>
@@ -5784,7 +5821,23 @@
                   <a:srgbClr val="002060"/>
                 </a:solidFill>
               </a:rPr>
-              <a:t>WE = write enable; set to 1 when  you want to write</a:t>
+              <a:t>WE = write enable; set to 1 </a:t>
+            </a:r>
+            <a:r>
+              <a:rPr lang="en-US" sz="2200" dirty="0" smtClean="0">
+                <a:solidFill>
+                  <a:srgbClr val="002060"/>
+                </a:solidFill>
+              </a:rPr>
+              <a:t>when </a:t>
+            </a:r>
+            <a:r>
+              <a:rPr lang="en-US" sz="2200" dirty="0">
+                <a:solidFill>
+                  <a:srgbClr val="002060"/>
+                </a:solidFill>
+              </a:rPr>
+              <a:t>you want to write</a:t>
             </a:r>
           </a:p>
           <a:p>
@@ -5844,7 +5897,7 @@
                   <a:srgbClr val="002060"/>
                 </a:solidFill>
               </a:rPr>
-              <a:t>rt</a:t>
+              <a:t>rd</a:t>
             </a:r>
             <a:r>
               <a:rPr lang="en-US" sz="2200" dirty="0" smtClean="0">
@@ -5870,7 +5923,7 @@
           <p:cNvPr id="7" name="Picture 6" descr="17 - The Register File and ALU  -  Protected View - PowerPoint">
             <a:extLst>
               <a:ext uri="{FF2B5EF4-FFF2-40B4-BE49-F238E27FC236}">
-                <a16:creationId xmlns:a16="http://schemas.microsoft.com/office/drawing/2014/main" id="{6DC4B539-A609-4F73-ABF6-FD35BBD221F2}"/>
+                <a16:creationId xmlns:a16="http://schemas.microsoft.com/office/drawing/2014/main" xmlns="" id="{6DC4B539-A609-4F73-ABF6-FD35BBD221F2}"/>
               </a:ext>
             </a:extLst>
           </p:cNvPr>
@@ -5974,7 +6027,7 @@
           <p:cNvPr id="37" name="TextBox 36">
             <a:extLst>
               <a:ext uri="{FF2B5EF4-FFF2-40B4-BE49-F238E27FC236}">
-                <a16:creationId xmlns:a16="http://schemas.microsoft.com/office/drawing/2014/main" id="{8C74D9A1-217A-4EB4-8E17-EF17B6598F01}"/>
+                <a16:creationId xmlns:a16="http://schemas.microsoft.com/office/drawing/2014/main" xmlns="" id="{8C74D9A1-217A-4EB4-8E17-EF17B6598F01}"/>
               </a:ext>
             </a:extLst>
           </p:cNvPr>
@@ -6113,7 +6166,15 @@
             </a:pPr>
             <a:r>
               <a:rPr lang="en-US" sz="2200" dirty="0" smtClean="0"/>
-              <a:t>the data input should be ignored</a:t>
+              <a:t>the data input </a:t>
+            </a:r>
+            <a:r>
+              <a:rPr lang="en-US" sz="2200" dirty="0" smtClean="0"/>
+              <a:t>to r7 should </a:t>
+            </a:r>
+            <a:r>
+              <a:rPr lang="en-US" sz="2200" dirty="0" smtClean="0"/>
+              <a:t>be ignored</a:t>
             </a:r>
             <a:endParaRPr lang="en-US" dirty="0"/>
           </a:p>
@@ -6212,7 +6273,7 @@
           <p:cNvPr id="37" name="TextBox 36">
             <a:extLst>
               <a:ext uri="{FF2B5EF4-FFF2-40B4-BE49-F238E27FC236}">
-                <a16:creationId xmlns:a16="http://schemas.microsoft.com/office/drawing/2014/main" id="{8C74D9A1-217A-4EB4-8E17-EF17B6598F01}"/>
+                <a16:creationId xmlns:a16="http://schemas.microsoft.com/office/drawing/2014/main" xmlns="" id="{8C74D9A1-217A-4EB4-8E17-EF17B6598F01}"/>
               </a:ext>
             </a:extLst>
           </p:cNvPr>
@@ -6258,11 +6319,7 @@
             </a:pPr>
             <a:r>
               <a:rPr lang="en-US" sz="2200" dirty="0" smtClean="0"/>
-              <a:t> </a:t>
-            </a:r>
-            <a:r>
-              <a:rPr lang="en-US" sz="2200" dirty="0" smtClean="0"/>
-              <a:t>writes to r7 should be enabled,</a:t>
+              <a:t> writes to r7 should be enabled,</a:t>
             </a:r>
             <a:endParaRPr lang="en-US" sz="2200" dirty="0"/>
           </a:p>
@@ -6311,15 +6368,7 @@
             </a:r>
             <a:r>
               <a:rPr lang="en-US" sz="2200" dirty="0" smtClean="0"/>
-              <a:t>de</a:t>
-            </a:r>
-            <a:r>
-              <a:rPr lang="en-US" sz="2200" dirty="0" smtClean="0"/>
-              <a:t>cremented </a:t>
-            </a:r>
-            <a:r>
-              <a:rPr lang="en-US" sz="2200" dirty="0" smtClean="0"/>
-              <a:t>to r7 - 1</a:t>
+              <a:t>decremented to r7 - 1</a:t>
             </a:r>
             <a:endParaRPr lang="en-US" sz="2200" dirty="0"/>
           </a:p>
@@ -6330,9 +6379,16 @@
             </a:pPr>
             <a:r>
               <a:rPr lang="en-US" sz="2200" dirty="0" smtClean="0"/>
-              <a:t>the data input should be ignored</a:t>
-            </a:r>
-            <a:endParaRPr lang="en-US" sz="2200" dirty="0" smtClean="0"/>
+              <a:t>the data </a:t>
+            </a:r>
+            <a:r>
+              <a:rPr lang="en-US" sz="2200" dirty="0" smtClean="0"/>
+              <a:t>input to r7 </a:t>
+            </a:r>
+            <a:r>
+              <a:rPr lang="en-US" sz="2200" dirty="0" smtClean="0"/>
+              <a:t>should be ignored</a:t>
+            </a:r>
           </a:p>
           <a:p>
             <a:endParaRPr lang="en-US" sz="2200" dirty="0" smtClean="0"/>
@@ -6380,7 +6436,15 @@
             </a:pPr>
             <a:r>
               <a:rPr lang="en-US" sz="2000" dirty="0" smtClean="0"/>
-              <a:t>For your circuit, this implies that you will need to add logic to determine whether the current register’s contents (r7) or the register’s content minus 1 (r7-1) should be sent to the read ports.</a:t>
+              <a:t>For your circuit, this implies that you will need to add logic to determine whether the current register’s contents (r7) or the register’s </a:t>
+            </a:r>
+            <a:r>
+              <a:rPr lang="en-US" sz="2000" dirty="0" smtClean="0"/>
+              <a:t>contents </a:t>
+            </a:r>
+            <a:r>
+              <a:rPr lang="en-US" sz="2000" dirty="0" smtClean="0"/>
+              <a:t>minus 1 (r7-1) should be sent to the read ports.</a:t>
             </a:r>
             <a:endParaRPr lang="en-US" dirty="0"/>
           </a:p>

</xml_diff>